<commit_message>
Añadir la parte de Hypothesis testing y ya
</commit_message>
<xml_diff>
--- a/Prueba con otros datos/POSTER-TEMPLATE.pptx
+++ b/Prueba con otros datos/POSTER-TEMPLATE.pptx
@@ -243,7 +243,7 @@
           <a:p>
             <a:fld id="{EB1FF5C0-9AEF-4218-9DC5-CA96FCC4DCA7}" type="datetimeFigureOut">
               <a:rPr lang="es-ES" smtClean="0"/>
-              <a:t>27/11/22</a:t>
+              <a:t>3/12/22</a:t>
             </a:fld>
             <a:endParaRPr lang="es-ES"/>
           </a:p>
@@ -413,7 +413,7 @@
           <a:p>
             <a:fld id="{EB1FF5C0-9AEF-4218-9DC5-CA96FCC4DCA7}" type="datetimeFigureOut">
               <a:rPr lang="es-ES" smtClean="0"/>
-              <a:t>27/11/22</a:t>
+              <a:t>3/12/22</a:t>
             </a:fld>
             <a:endParaRPr lang="es-ES"/>
           </a:p>
@@ -593,7 +593,7 @@
           <a:p>
             <a:fld id="{EB1FF5C0-9AEF-4218-9DC5-CA96FCC4DCA7}" type="datetimeFigureOut">
               <a:rPr lang="es-ES" smtClean="0"/>
-              <a:t>27/11/22</a:t>
+              <a:t>3/12/22</a:t>
             </a:fld>
             <a:endParaRPr lang="es-ES"/>
           </a:p>
@@ -763,7 +763,7 @@
           <a:p>
             <a:fld id="{EB1FF5C0-9AEF-4218-9DC5-CA96FCC4DCA7}" type="datetimeFigureOut">
               <a:rPr lang="es-ES" smtClean="0"/>
-              <a:t>27/11/22</a:t>
+              <a:t>3/12/22</a:t>
             </a:fld>
             <a:endParaRPr lang="es-ES"/>
           </a:p>
@@ -1007,7 +1007,7 @@
           <a:p>
             <a:fld id="{EB1FF5C0-9AEF-4218-9DC5-CA96FCC4DCA7}" type="datetimeFigureOut">
               <a:rPr lang="es-ES" smtClean="0"/>
-              <a:t>27/11/22</a:t>
+              <a:t>3/12/22</a:t>
             </a:fld>
             <a:endParaRPr lang="es-ES"/>
           </a:p>
@@ -1239,7 +1239,7 @@
           <a:p>
             <a:fld id="{EB1FF5C0-9AEF-4218-9DC5-CA96FCC4DCA7}" type="datetimeFigureOut">
               <a:rPr lang="es-ES" smtClean="0"/>
-              <a:t>27/11/22</a:t>
+              <a:t>3/12/22</a:t>
             </a:fld>
             <a:endParaRPr lang="es-ES"/>
           </a:p>
@@ -1606,7 +1606,7 @@
           <a:p>
             <a:fld id="{EB1FF5C0-9AEF-4218-9DC5-CA96FCC4DCA7}" type="datetimeFigureOut">
               <a:rPr lang="es-ES" smtClean="0"/>
-              <a:t>27/11/22</a:t>
+              <a:t>3/12/22</a:t>
             </a:fld>
             <a:endParaRPr lang="es-ES"/>
           </a:p>
@@ -1724,7 +1724,7 @@
           <a:p>
             <a:fld id="{EB1FF5C0-9AEF-4218-9DC5-CA96FCC4DCA7}" type="datetimeFigureOut">
               <a:rPr lang="es-ES" smtClean="0"/>
-              <a:t>27/11/22</a:t>
+              <a:t>3/12/22</a:t>
             </a:fld>
             <a:endParaRPr lang="es-ES"/>
           </a:p>
@@ -1819,7 +1819,7 @@
           <a:p>
             <a:fld id="{EB1FF5C0-9AEF-4218-9DC5-CA96FCC4DCA7}" type="datetimeFigureOut">
               <a:rPr lang="es-ES" smtClean="0"/>
-              <a:t>27/11/22</a:t>
+              <a:t>3/12/22</a:t>
             </a:fld>
             <a:endParaRPr lang="es-ES"/>
           </a:p>
@@ -2096,7 +2096,7 @@
           <a:p>
             <a:fld id="{EB1FF5C0-9AEF-4218-9DC5-CA96FCC4DCA7}" type="datetimeFigureOut">
               <a:rPr lang="es-ES" smtClean="0"/>
-              <a:t>27/11/22</a:t>
+              <a:t>3/12/22</a:t>
             </a:fld>
             <a:endParaRPr lang="es-ES"/>
           </a:p>
@@ -2353,7 +2353,7 @@
           <a:p>
             <a:fld id="{EB1FF5C0-9AEF-4218-9DC5-CA96FCC4DCA7}" type="datetimeFigureOut">
               <a:rPr lang="es-ES" smtClean="0"/>
-              <a:t>27/11/22</a:t>
+              <a:t>3/12/22</a:t>
             </a:fld>
             <a:endParaRPr lang="es-ES"/>
           </a:p>
@@ -2566,7 +2566,7 @@
           <a:p>
             <a:fld id="{EB1FF5C0-9AEF-4218-9DC5-CA96FCC4DCA7}" type="datetimeFigureOut">
               <a:rPr lang="es-ES" smtClean="0"/>
-              <a:t>27/11/22</a:t>
+              <a:t>3/12/22</a:t>
             </a:fld>
             <a:endParaRPr lang="es-ES"/>
           </a:p>
@@ -3015,24 +3015,48 @@
                   <a:schemeClr val="bg1"/>
                 </a:solidFill>
               </a:rPr>
-              <a:t>TITLE</a:t>
-            </a:r>
+              <a:t>Spotify Top </a:t>
+            </a:r>
+            <a:r>
+              <a:rPr lang="es-ES" sz="10000" dirty="0" err="1">
+                <a:solidFill>
+                  <a:schemeClr val="bg1"/>
+                </a:solidFill>
+              </a:rPr>
+              <a:t>Songs</a:t>
+            </a:r>
+            <a:r>
+              <a:rPr lang="es-ES" sz="10000" dirty="0">
+                <a:solidFill>
+                  <a:schemeClr val="bg1"/>
+                </a:solidFill>
+              </a:rPr>
+              <a:t> </a:t>
+            </a:r>
+            <a:r>
+              <a:rPr lang="es-ES" sz="10000" dirty="0" err="1">
+                <a:solidFill>
+                  <a:schemeClr val="bg1"/>
+                </a:solidFill>
+              </a:rPr>
+              <a:t>Analysis</a:t>
+            </a:r>
+            <a:endParaRPr lang="es-ES" sz="10000" dirty="0">
+              <a:solidFill>
+                <a:schemeClr val="bg1"/>
+              </a:solidFill>
+            </a:endParaRPr>
           </a:p>
           <a:p>
             <a:pPr algn="ctr"/>
             <a:r>
-              <a:rPr lang="es-ES" sz="4000" dirty="0" err="1">
+              <a:rPr lang="es-ES" sz="4000" dirty="0">
                 <a:solidFill>
                   <a:schemeClr val="bg1"/>
                 </a:solidFill>
               </a:rPr>
-              <a:t>Authors</a:t>
-            </a:r>
-            <a:endParaRPr lang="es-ES" sz="4000" dirty="0">
-              <a:solidFill>
-                <a:schemeClr val="bg1"/>
-              </a:solidFill>
-            </a:endParaRPr>
+              <a:t>Eduardo Alarcón and Alfonso Pineda</a:t>
+            </a:r>
           </a:p>
         </p:txBody>
       </p:sp>
@@ -7192,13 +7216,8 @@
             </a:r>
             <a:r>
               <a:rPr lang="es-ES" b="1" dirty="0"/>
-              <a:t> </a:t>
-            </a:r>
-            <a:r>
-              <a:rPr lang="es-ES" b="1"/>
-              <a:t>- 2019/2020</a:t>
-            </a:r>
-            <a:endParaRPr lang="es-ES" b="1" dirty="0"/>
+              <a:t> - 2022/2023</a:t>
+            </a:r>
           </a:p>
         </p:txBody>
       </p:sp>

</xml_diff>